<commit_message>
final presentation as presented
</commit_message>
<xml_diff>
--- a/deep-learning-sca-paper-presentation.pptx
+++ b/deep-learning-sca-paper-presentation.pptx
@@ -5,10 +5,10 @@
     <p:sldMasterId id="2147483648" r:id="rId1"/>
   </p:sldMasterIdLst>
   <p:notesMasterIdLst>
-    <p:notesMasterId r:id="rId20"/>
+    <p:notesMasterId r:id="rId21"/>
   </p:notesMasterIdLst>
   <p:handoutMasterIdLst>
-    <p:handoutMasterId r:id="rId21"/>
+    <p:handoutMasterId r:id="rId22"/>
   </p:handoutMasterIdLst>
   <p:sldIdLst>
     <p:sldId id="257" r:id="rId2"/>
@@ -18,17 +18,18 @@
     <p:sldId id="261" r:id="rId6"/>
     <p:sldId id="262" r:id="rId7"/>
     <p:sldId id="269" r:id="rId8"/>
-    <p:sldId id="267" r:id="rId9"/>
+    <p:sldId id="280" r:id="rId9"/>
     <p:sldId id="268" r:id="rId10"/>
     <p:sldId id="275" r:id="rId11"/>
     <p:sldId id="274" r:id="rId12"/>
     <p:sldId id="276" r:id="rId13"/>
     <p:sldId id="278" r:id="rId14"/>
-    <p:sldId id="277" r:id="rId15"/>
-    <p:sldId id="265" r:id="rId16"/>
-    <p:sldId id="264" r:id="rId17"/>
-    <p:sldId id="263" r:id="rId18"/>
-    <p:sldId id="279" r:id="rId19"/>
+    <p:sldId id="267" r:id="rId15"/>
+    <p:sldId id="277" r:id="rId16"/>
+    <p:sldId id="265" r:id="rId17"/>
+    <p:sldId id="264" r:id="rId18"/>
+    <p:sldId id="263" r:id="rId19"/>
+    <p:sldId id="279" r:id="rId20"/>
   </p:sldIdLst>
   <p:sldSz cx="9144000" cy="6858000" type="screen4x3"/>
   <p:notesSz cx="6858000" cy="9144000"/>
@@ -10173,7 +10174,7 @@
               <a:pPr>
                 <a:defRPr/>
               </a:pPr>
-              <a:t>20/07/2017</a:t>
+              <a:t>21/07/2017</a:t>
             </a:fld>
             <a:endParaRPr lang="en-GB" dirty="0"/>
           </a:p>
@@ -10392,7 +10393,7 @@
               <a:pPr>
                 <a:defRPr/>
               </a:pPr>
-              <a:t>20/07/2017</a:t>
+              <a:t>21/07/2017</a:t>
             </a:fld>
             <a:endParaRPr lang="en-GB"/>
           </a:p>
@@ -11123,18 +11124,6 @@
           <a:bodyPr/>
           <a:lstStyle/>
           <a:p>
-            <a:r>
-              <a:rPr lang="en-GB" dirty="0"/>
-              <a:t>Labelled data set </a:t>
-            </a:r>
-            <a:r>
-              <a:rPr lang="en-GB" dirty="0">
-                <a:sym typeface="Wingdings" panose="05000000000000000000" pitchFamily="2" charset="2"/>
-              </a:rPr>
-              <a:t> supervised learning</a:t>
-            </a:r>
-          </a:p>
-          <a:p>
             <a:pPr marL="0" marR="0" lvl="0" indent="0" algn="l" defTabSz="914400" rtl="0" eaLnBrk="1" fontAlgn="base" latinLnBrk="0" hangingPunct="1">
               <a:lnSpc>
                 <a:spcPct val="100000"/>
@@ -11153,14 +11142,28 @@
               <a:defRPr/>
             </a:pPr>
             <a:r>
+              <a:rPr lang="en-GB" sz="1200" dirty="0"/>
+              <a:t>Now: backpropagation possible on large NNs</a:t>
+            </a:r>
+          </a:p>
+          <a:p>
+            <a:r>
               <a:rPr lang="en-GB" dirty="0"/>
-              <a:t>1k traces per sensitive value</a:t>
+              <a:t>Many different techniques, each has own strengths</a:t>
             </a:r>
           </a:p>
           <a:p>
             <a:r>
               <a:rPr lang="en-GB" dirty="0"/>
-              <a:t>Input each trace individually, as Matrix for CNN, 3253 inputs for MLP, others</a:t>
+              <a:t>Revived through more computational power -&gt; Backpropagation </a:t>
+            </a:r>
+            <a:r>
+              <a:rPr lang="en-GB" dirty="0" err="1"/>
+              <a:t>algo</a:t>
+            </a:r>
+            <a:r>
+              <a:rPr lang="en-GB" dirty="0"/>
+              <a:t> now possible on large DNNs</a:t>
             </a:r>
           </a:p>
           <a:p>
@@ -11200,7 +11203,7 @@
     </p:spTree>
     <p:extLst>
       <p:ext uri="{BB962C8B-B14F-4D97-AF65-F5344CB8AC3E}">
-        <p14:creationId xmlns:p14="http://schemas.microsoft.com/office/powerpoint/2010/main" val="1158799826"/>
+        <p14:creationId xmlns:p14="http://schemas.microsoft.com/office/powerpoint/2010/main" val="633495333"/>
       </p:ext>
     </p:extLst>
   </p:cSld>
@@ -11256,26 +11259,46 @@
           <a:p>
             <a:r>
               <a:rPr lang="en-GB" dirty="0"/>
-              <a:t>CNN best performance, slightly better than AE</a:t>
-            </a:r>
-          </a:p>
-          <a:p>
+              <a:t>Labelled data set </a:t>
+            </a:r>
+            <a:r>
+              <a:rPr lang="en-GB" dirty="0">
+                <a:sym typeface="Wingdings" panose="05000000000000000000" pitchFamily="2" charset="2"/>
+              </a:rPr>
+              <a:t> supervised learning</a:t>
+            </a:r>
+          </a:p>
+          <a:p>
+            <a:pPr marL="0" marR="0" lvl="0" indent="0" algn="l" defTabSz="914400" rtl="0" eaLnBrk="1" fontAlgn="base" latinLnBrk="0" hangingPunct="1">
+              <a:lnSpc>
+                <a:spcPct val="100000"/>
+              </a:lnSpc>
+              <a:spcBef>
+                <a:spcPct val="30000"/>
+              </a:spcBef>
+              <a:spcAft>
+                <a:spcPct val="0"/>
+              </a:spcAft>
+              <a:buClrTx/>
+              <a:buSzTx/>
+              <a:buFontTx/>
+              <a:buNone/>
+              <a:tabLst/>
+              <a:defRPr/>
+            </a:pPr>
             <a:r>
               <a:rPr lang="en-GB" dirty="0"/>
-              <a:t>CNN requires less than half of the traces needed for key recovery compared to TA</a:t>
+              <a:t>1k traces per sensitive value</a:t>
             </a:r>
           </a:p>
           <a:p>
             <a:r>
               <a:rPr lang="en-GB" dirty="0"/>
-              <a:t>Manual feature extraction using PCA not advantageous </a:t>
-            </a:r>
-          </a:p>
-          <a:p>
-            <a:r>
-              <a:rPr lang="en-GB" dirty="0"/>
-              <a:t>LSTM not that good as there is no further relationship between bits far apart, time independence </a:t>
-            </a:r>
+              <a:t>Input each trace individually, as Matrix for CNN, 3253 inputs for MLP, others</a:t>
+            </a:r>
+          </a:p>
+          <a:p>
+            <a:endParaRPr lang="en-GB" dirty="0"/>
           </a:p>
         </p:txBody>
       </p:sp>
@@ -11311,7 +11334,7 @@
     </p:spTree>
     <p:extLst>
       <p:ext uri="{BB962C8B-B14F-4D97-AF65-F5344CB8AC3E}">
-        <p14:creationId xmlns:p14="http://schemas.microsoft.com/office/powerpoint/2010/main" val="3417501818"/>
+        <p14:creationId xmlns:p14="http://schemas.microsoft.com/office/powerpoint/2010/main" val="1158799826"/>
       </p:ext>
     </p:extLst>
   </p:cSld>
@@ -11367,7 +11390,25 @@
           <a:p>
             <a:r>
               <a:rPr lang="en-GB" dirty="0"/>
-              <a:t>Basically template attack but instead of Gaussian assumption profile with a NN</a:t>
+              <a:t>CNN best performance, slightly better than AE</a:t>
+            </a:r>
+          </a:p>
+          <a:p>
+            <a:r>
+              <a:rPr lang="en-GB" dirty="0"/>
+              <a:t>CNN requires less than half of the traces needed for key recovery compared to TA</a:t>
+            </a:r>
+          </a:p>
+          <a:p>
+            <a:r>
+              <a:rPr lang="en-GB" dirty="0"/>
+              <a:t>Manual feature extraction using PCA not advantageous </a:t>
+            </a:r>
+          </a:p>
+          <a:p>
+            <a:r>
+              <a:rPr lang="en-GB" dirty="0"/>
+              <a:t>LSTM not that good as there is no further relationship between bits far apart, time independence </a:t>
             </a:r>
           </a:p>
         </p:txBody>
@@ -11395,7 +11436,7 @@
               <a:pPr>
                 <a:defRPr/>
               </a:pPr>
-              <a:t>17</a:t>
+              <a:t>16</a:t>
             </a:fld>
             <a:endParaRPr lang="en-GB"/>
           </a:p>
@@ -11404,7 +11445,7 @@
     </p:spTree>
     <p:extLst>
       <p:ext uri="{BB962C8B-B14F-4D97-AF65-F5344CB8AC3E}">
-        <p14:creationId xmlns:p14="http://schemas.microsoft.com/office/powerpoint/2010/main" val="1060795393"/>
+        <p14:creationId xmlns:p14="http://schemas.microsoft.com/office/powerpoint/2010/main" val="3417501818"/>
       </p:ext>
     </p:extLst>
   </p:cSld>
@@ -11460,50 +11501,8 @@
           <a:p>
             <a:r>
               <a:rPr lang="en-GB" dirty="0"/>
-              <a:t>Mu:=mean</a:t>
-            </a:r>
-          </a:p>
-          <a:p>
-            <a:r>
-              <a:rPr lang="en-GB" dirty="0"/>
-              <a:t>Sigma:=</a:t>
-            </a:r>
-            <a:r>
-              <a:rPr lang="en-GB" dirty="0" err="1"/>
-              <a:t>standartabweichung</a:t>
-            </a:r>
-            <a:endParaRPr lang="en-GB" dirty="0"/>
-          </a:p>
-          <a:p>
-            <a:r>
-              <a:rPr lang="en-GB" dirty="0"/>
-              <a:t>Z:=sensitive value</a:t>
-            </a:r>
-          </a:p>
-          <a:p>
-            <a:r>
-              <a:rPr lang="en-GB" dirty="0"/>
-              <a:t>L:=trace</a:t>
-            </a:r>
-          </a:p>
-          <a:p>
-            <a:r>
-              <a:rPr lang="en-GB" dirty="0"/>
-              <a:t>Sigma:=covariance matrix</a:t>
-            </a:r>
-          </a:p>
-          <a:p>
-            <a:r>
-              <a:rPr lang="en-GB" dirty="0" err="1"/>
-              <a:t>Mu_z</a:t>
-            </a:r>
-            <a:r>
-              <a:rPr lang="en-GB" dirty="0"/>
-              <a:t>:=mean(Sigma)</a:t>
-            </a:r>
-          </a:p>
-          <a:p>
-            <a:endParaRPr lang="en-GB" dirty="0"/>
+              <a:t>Basically template attack but instead of Gaussian assumption profile with a NN</a:t>
+            </a:r>
           </a:p>
         </p:txBody>
       </p:sp>
@@ -11531,6 +11530,141 @@
                 <a:defRPr/>
               </a:pPr>
               <a:t>18</a:t>
+            </a:fld>
+            <a:endParaRPr lang="en-GB"/>
+          </a:p>
+        </p:txBody>
+      </p:sp>
+    </p:spTree>
+    <p:extLst>
+      <p:ext uri="{BB962C8B-B14F-4D97-AF65-F5344CB8AC3E}">
+        <p14:creationId xmlns:p14="http://schemas.microsoft.com/office/powerpoint/2010/main" val="1060795393"/>
+      </p:ext>
+    </p:extLst>
+  </p:cSld>
+  <p:clrMapOvr>
+    <a:masterClrMapping/>
+  </p:clrMapOvr>
+</p:notes>
+</file>
+
+<file path=ppt/notesSlides/notesSlide16.xml><?xml version="1.0" encoding="utf-8"?>
+<p:notes xmlns:a="http://schemas.openxmlformats.org/drawingml/2006/main" xmlns:r="http://schemas.openxmlformats.org/officeDocument/2006/relationships" xmlns:p="http://schemas.openxmlformats.org/presentationml/2006/main">
+  <p:cSld>
+    <p:spTree>
+      <p:nvGrpSpPr>
+        <p:cNvPr id="1" name=""/>
+        <p:cNvGrpSpPr/>
+        <p:nvPr/>
+      </p:nvGrpSpPr>
+      <p:grpSpPr>
+        <a:xfrm>
+          <a:off x="0" y="0"/>
+          <a:ext cx="0" cy="0"/>
+          <a:chOff x="0" y="0"/>
+          <a:chExt cx="0" cy="0"/>
+        </a:xfrm>
+      </p:grpSpPr>
+      <p:sp>
+        <p:nvSpPr>
+          <p:cNvPr id="2" name="Slide Image Placeholder 1"/>
+          <p:cNvSpPr>
+            <a:spLocks noGrp="1" noRot="1" noChangeAspect="1"/>
+          </p:cNvSpPr>
+          <p:nvPr>
+            <p:ph type="sldImg"/>
+          </p:nvPr>
+        </p:nvSpPr>
+        <p:spPr/>
+      </p:sp>
+      <p:sp>
+        <p:nvSpPr>
+          <p:cNvPr id="3" name="Notes Placeholder 2"/>
+          <p:cNvSpPr>
+            <a:spLocks noGrp="1"/>
+          </p:cNvSpPr>
+          <p:nvPr>
+            <p:ph type="body" idx="1"/>
+          </p:nvPr>
+        </p:nvSpPr>
+        <p:spPr/>
+        <p:txBody>
+          <a:bodyPr/>
+          <a:lstStyle/>
+          <a:p>
+            <a:r>
+              <a:rPr lang="en-GB" dirty="0"/>
+              <a:t>Mu:=mean</a:t>
+            </a:r>
+          </a:p>
+          <a:p>
+            <a:r>
+              <a:rPr lang="en-GB" dirty="0"/>
+              <a:t>Sigma:=</a:t>
+            </a:r>
+            <a:r>
+              <a:rPr lang="en-GB" dirty="0" err="1"/>
+              <a:t>standartabweichung</a:t>
+            </a:r>
+            <a:endParaRPr lang="en-GB" dirty="0"/>
+          </a:p>
+          <a:p>
+            <a:r>
+              <a:rPr lang="en-GB" dirty="0"/>
+              <a:t>Z:=sensitive value</a:t>
+            </a:r>
+          </a:p>
+          <a:p>
+            <a:r>
+              <a:rPr lang="en-GB" dirty="0"/>
+              <a:t>L:=trace</a:t>
+            </a:r>
+          </a:p>
+          <a:p>
+            <a:r>
+              <a:rPr lang="en-GB" dirty="0"/>
+              <a:t>Sigma:=covariance matrix</a:t>
+            </a:r>
+          </a:p>
+          <a:p>
+            <a:r>
+              <a:rPr lang="en-GB" dirty="0" err="1"/>
+              <a:t>Mu_z</a:t>
+            </a:r>
+            <a:r>
+              <a:rPr lang="en-GB" dirty="0"/>
+              <a:t>:=mean(Sigma)</a:t>
+            </a:r>
+          </a:p>
+          <a:p>
+            <a:endParaRPr lang="en-GB" dirty="0"/>
+          </a:p>
+        </p:txBody>
+      </p:sp>
+      <p:sp>
+        <p:nvSpPr>
+          <p:cNvPr id="4" name="Slide Number Placeholder 3"/>
+          <p:cNvSpPr>
+            <a:spLocks noGrp="1"/>
+          </p:cNvSpPr>
+          <p:nvPr>
+            <p:ph type="sldNum" sz="quarter" idx="10"/>
+          </p:nvPr>
+        </p:nvSpPr>
+        <p:spPr/>
+        <p:txBody>
+          <a:bodyPr/>
+          <a:lstStyle/>
+          <a:p>
+            <a:pPr>
+              <a:defRPr/>
+            </a:pPr>
+            <a:fld id="{00AFC6D0-44D5-4EB7-828F-6F464F83D79A}" type="slidenum">
+              <a:rPr lang="en-GB" smtClean="0"/>
+              <a:pPr>
+                <a:defRPr/>
+              </a:pPr>
+              <a:t>19</a:t>
             </a:fld>
             <a:endParaRPr lang="en-GB"/>
           </a:p>
@@ -12099,7 +12233,7 @@
     </p:spTree>
     <p:extLst>
       <p:ext uri="{BB962C8B-B14F-4D97-AF65-F5344CB8AC3E}">
-        <p14:creationId xmlns:p14="http://schemas.microsoft.com/office/powerpoint/2010/main" val="633495333"/>
+        <p14:creationId xmlns:p14="http://schemas.microsoft.com/office/powerpoint/2010/main" val="3341821822"/>
       </p:ext>
     </p:extLst>
   </p:cSld>
@@ -12572,7 +12706,7 @@
             </a:pPr>
             <a:fld id="{B04D9ECC-31C8-4A53-8131-35BAE7995783}" type="datetime1">
               <a:rPr lang="de-DE" noProof="0" smtClean="0"/>
-              <a:t>20.07.2017</a:t>
+              <a:t>21.07.2017</a:t>
             </a:fld>
             <a:endParaRPr lang="de-DE" noProof="0"/>
           </a:p>
@@ -12824,7 +12958,7 @@
             </a:pPr>
             <a:fld id="{1178E5D5-CA76-4C59-B34C-272F56E3C42B}" type="datetime1">
               <a:rPr lang="de-DE" noProof="0" smtClean="0"/>
-              <a:t>20.07.2017</a:t>
+              <a:t>21.07.2017</a:t>
             </a:fld>
             <a:endParaRPr lang="de-DE" noProof="0"/>
           </a:p>
@@ -13163,7 +13297,7 @@
             </a:pPr>
             <a:fld id="{DF75CF1A-A7C7-4023-A193-69E45C4BA344}" type="datetime1">
               <a:rPr lang="de-DE" noProof="0" smtClean="0"/>
-              <a:t>20.07.2017</a:t>
+              <a:t>21.07.2017</a:t>
             </a:fld>
             <a:endParaRPr lang="de-DE" noProof="0"/>
           </a:p>
@@ -13445,7 +13579,7 @@
             </a:pPr>
             <a:fld id="{5144C4FB-9881-443F-B4FF-72995425415D}" type="datetime1">
               <a:rPr lang="de-DE" noProof="0" smtClean="0"/>
-              <a:t>20.07.2017</a:t>
+              <a:t>21.07.2017</a:t>
             </a:fld>
             <a:endParaRPr lang="de-DE" noProof="0"/>
           </a:p>
@@ -14773,6 +14907,84 @@
           </a:p>
         </p:txBody>
       </p:sp>
+      <p:sp>
+        <p:nvSpPr>
+          <p:cNvPr id="5" name="TextBox 4">
+            <a:extLst>
+              <a:ext uri="{FF2B5EF4-FFF2-40B4-BE49-F238E27FC236}">
+                <a16:creationId xmlns:a16="http://schemas.microsoft.com/office/drawing/2014/main" id="{8FE4C0A3-8803-45B1-8A24-0625D0ACDFEF}"/>
+              </a:ext>
+            </a:extLst>
+          </p:cNvPr>
+          <p:cNvSpPr txBox="1"/>
+          <p:nvPr/>
+        </p:nvSpPr>
+        <p:spPr>
+          <a:xfrm>
+            <a:off x="5502729" y="2008414"/>
+            <a:ext cx="2579914" cy="584775"/>
+          </a:xfrm>
+          <a:prstGeom prst="rect">
+            <a:avLst/>
+          </a:prstGeom>
+          <a:noFill/>
+        </p:spPr>
+        <p:txBody>
+          <a:bodyPr wrap="square" rtlCol="0">
+            <a:spAutoFit/>
+          </a:bodyPr>
+          <a:lstStyle/>
+          <a:p>
+            <a:r>
+              <a:rPr lang="en-GB" sz="3200" dirty="0">
+                <a:solidFill>
+                  <a:srgbClr val="2AA098"/>
+                </a:solidFill>
+              </a:rPr>
+              <a:t>Feature map</a:t>
+            </a:r>
+          </a:p>
+        </p:txBody>
+      </p:sp>
+      <p:sp>
+        <p:nvSpPr>
+          <p:cNvPr id="6" name="TextBox 5">
+            <a:extLst>
+              <a:ext uri="{FF2B5EF4-FFF2-40B4-BE49-F238E27FC236}">
+                <a16:creationId xmlns:a16="http://schemas.microsoft.com/office/drawing/2014/main" id="{AFF0C728-4BEA-4EC9-B46A-36C67669E6E0}"/>
+              </a:ext>
+            </a:extLst>
+          </p:cNvPr>
+          <p:cNvSpPr txBox="1"/>
+          <p:nvPr/>
+        </p:nvSpPr>
+        <p:spPr>
+          <a:xfrm>
+            <a:off x="6633291" y="3835435"/>
+            <a:ext cx="1095172" cy="584775"/>
+          </a:xfrm>
+          <a:prstGeom prst="rect">
+            <a:avLst/>
+          </a:prstGeom>
+          <a:noFill/>
+        </p:spPr>
+        <p:txBody>
+          <a:bodyPr wrap="none" rtlCol="0">
+            <a:spAutoFit/>
+          </a:bodyPr>
+          <a:lstStyle/>
+          <a:p>
+            <a:r>
+              <a:rPr lang="en-GB" sz="3200" dirty="0">
+                <a:solidFill>
+                  <a:srgbClr val="268BD2"/>
+                </a:solidFill>
+              </a:rPr>
+              <a:t>Input</a:t>
+            </a:r>
+          </a:p>
+        </p:txBody>
+      </p:sp>
     </p:spTree>
     <p:extLst>
       <p:ext uri="{BB962C8B-B14F-4D97-AF65-F5344CB8AC3E}">
@@ -15334,6 +15546,84 @@
                 <a:srgbClr val="FF0000"/>
               </a:solidFill>
             </a:endParaRPr>
+          </a:p>
+        </p:txBody>
+      </p:sp>
+      <p:sp>
+        <p:nvSpPr>
+          <p:cNvPr id="21" name="TextBox 20">
+            <a:extLst>
+              <a:ext uri="{FF2B5EF4-FFF2-40B4-BE49-F238E27FC236}">
+                <a16:creationId xmlns:a16="http://schemas.microsoft.com/office/drawing/2014/main" id="{A72AF319-3CED-44FE-B2EC-61DC2AFF7AAF}"/>
+              </a:ext>
+            </a:extLst>
+          </p:cNvPr>
+          <p:cNvSpPr txBox="1"/>
+          <p:nvPr/>
+        </p:nvSpPr>
+        <p:spPr>
+          <a:xfrm>
+            <a:off x="5502729" y="2008414"/>
+            <a:ext cx="2579914" cy="584775"/>
+          </a:xfrm>
+          <a:prstGeom prst="rect">
+            <a:avLst/>
+          </a:prstGeom>
+          <a:noFill/>
+        </p:spPr>
+        <p:txBody>
+          <a:bodyPr wrap="square" rtlCol="0">
+            <a:spAutoFit/>
+          </a:bodyPr>
+          <a:lstStyle/>
+          <a:p>
+            <a:r>
+              <a:rPr lang="en-GB" sz="3200" dirty="0">
+                <a:solidFill>
+                  <a:srgbClr val="2AA098"/>
+                </a:solidFill>
+              </a:rPr>
+              <a:t>Feature map</a:t>
+            </a:r>
+          </a:p>
+        </p:txBody>
+      </p:sp>
+      <p:sp>
+        <p:nvSpPr>
+          <p:cNvPr id="22" name="TextBox 21">
+            <a:extLst>
+              <a:ext uri="{FF2B5EF4-FFF2-40B4-BE49-F238E27FC236}">
+                <a16:creationId xmlns:a16="http://schemas.microsoft.com/office/drawing/2014/main" id="{46230B72-B8B3-4E08-B94C-D60BDD49B040}"/>
+              </a:ext>
+            </a:extLst>
+          </p:cNvPr>
+          <p:cNvSpPr txBox="1"/>
+          <p:nvPr/>
+        </p:nvSpPr>
+        <p:spPr>
+          <a:xfrm>
+            <a:off x="6633291" y="3835435"/>
+            <a:ext cx="1095172" cy="584775"/>
+          </a:xfrm>
+          <a:prstGeom prst="rect">
+            <a:avLst/>
+          </a:prstGeom>
+          <a:noFill/>
+        </p:spPr>
+        <p:txBody>
+          <a:bodyPr wrap="none" rtlCol="0">
+            <a:spAutoFit/>
+          </a:bodyPr>
+          <a:lstStyle/>
+          <a:p>
+            <a:r>
+              <a:rPr lang="en-GB" sz="3200" dirty="0">
+                <a:solidFill>
+                  <a:srgbClr val="268BD2"/>
+                </a:solidFill>
+              </a:rPr>
+              <a:t>Input</a:t>
+            </a:r>
           </a:p>
         </p:txBody>
       </p:sp>
@@ -15536,6 +15826,330 @@
           <p:cNvPr id="2" name="Title 1">
             <a:extLst>
               <a:ext uri="{FF2B5EF4-FFF2-40B4-BE49-F238E27FC236}">
+                <a16:creationId xmlns:a16="http://schemas.microsoft.com/office/drawing/2014/main" id="{9C37B538-7A41-4A14-A49F-DFC1277F9406}"/>
+              </a:ext>
+            </a:extLst>
+          </p:cNvPr>
+          <p:cNvSpPr>
+            <a:spLocks noGrp="1"/>
+          </p:cNvSpPr>
+          <p:nvPr>
+            <p:ph type="title"/>
+          </p:nvPr>
+        </p:nvSpPr>
+        <p:spPr/>
+        <p:txBody>
+          <a:bodyPr/>
+          <a:lstStyle/>
+          <a:p>
+            <a:r>
+              <a:rPr lang="en-GB" dirty="0"/>
+              <a:t>Deep Learning: an overview</a:t>
+            </a:r>
+          </a:p>
+        </p:txBody>
+      </p:sp>
+      <p:sp>
+        <p:nvSpPr>
+          <p:cNvPr id="3" name="Content Placeholder 2">
+            <a:extLst>
+              <a:ext uri="{FF2B5EF4-FFF2-40B4-BE49-F238E27FC236}">
+                <a16:creationId xmlns:a16="http://schemas.microsoft.com/office/drawing/2014/main" id="{D9C923AD-B011-4DC4-ADF7-61B6B58F8D8D}"/>
+              </a:ext>
+            </a:extLst>
+          </p:cNvPr>
+          <p:cNvSpPr>
+            <a:spLocks noGrp="1"/>
+          </p:cNvSpPr>
+          <p:nvPr>
+            <p:ph idx="1"/>
+          </p:nvPr>
+        </p:nvSpPr>
+        <p:spPr>
+          <a:xfrm>
+            <a:off x="358775" y="2869324"/>
+            <a:ext cx="8421688" cy="3398276"/>
+          </a:xfrm>
+        </p:spPr>
+        <p:txBody>
+          <a:bodyPr>
+            <a:normAutofit/>
+          </a:bodyPr>
+          <a:lstStyle/>
+          <a:p>
+            <a:pPr marL="285750" indent="-285750">
+              <a:buFont typeface="Arial" panose="020B0604020202020204" pitchFamily="34" charset="0"/>
+              <a:buChar char="•"/>
+            </a:pPr>
+            <a:endParaRPr lang="en-GB" sz="1600" dirty="0"/>
+          </a:p>
+          <a:p>
+            <a:pPr marL="285750" indent="-285750">
+              <a:buFont typeface="Arial" panose="020B0604020202020204" pitchFamily="34" charset="0"/>
+              <a:buChar char="•"/>
+            </a:pPr>
+            <a:r>
+              <a:rPr lang="en-GB" sz="3000" dirty="0"/>
+              <a:t>Many types, each has own strengths</a:t>
+            </a:r>
+          </a:p>
+          <a:p>
+            <a:pPr marL="461963" lvl="1" indent="-285750"/>
+            <a:r>
+              <a:rPr lang="en-GB" sz="3000" dirty="0">
+                <a:solidFill>
+                  <a:schemeClr val="bg1">
+                    <a:lumMod val="65000"/>
+                  </a:schemeClr>
+                </a:solidFill>
+              </a:rPr>
+              <a:t>Multi Layer Perceptron</a:t>
+            </a:r>
+          </a:p>
+          <a:p>
+            <a:pPr marL="461963" lvl="1" indent="-285750"/>
+            <a:r>
+              <a:rPr lang="en-GB" sz="3000" dirty="0">
+                <a:solidFill>
+                  <a:schemeClr val="bg1">
+                    <a:lumMod val="65000"/>
+                  </a:schemeClr>
+                </a:solidFill>
+              </a:rPr>
+              <a:t>Convolutional NN</a:t>
+            </a:r>
+          </a:p>
+          <a:p>
+            <a:pPr marL="461963" lvl="1" indent="-285750"/>
+            <a:r>
+              <a:rPr lang="en-GB" sz="3000" dirty="0"/>
+              <a:t>Recurrent NN</a:t>
+            </a:r>
+          </a:p>
+          <a:p>
+            <a:pPr marL="461963" lvl="1" indent="-285750"/>
+            <a:r>
+              <a:rPr lang="en-GB" sz="3000" dirty="0"/>
+              <a:t>Stacked Auto Encoder</a:t>
+            </a:r>
+          </a:p>
+        </p:txBody>
+      </p:sp>
+      <p:sp>
+        <p:nvSpPr>
+          <p:cNvPr id="4" name="Slide Number Placeholder 3">
+            <a:extLst>
+              <a:ext uri="{FF2B5EF4-FFF2-40B4-BE49-F238E27FC236}">
+                <a16:creationId xmlns:a16="http://schemas.microsoft.com/office/drawing/2014/main" id="{C3C7FABA-5634-4256-A6A9-33774C765788}"/>
+              </a:ext>
+            </a:extLst>
+          </p:cNvPr>
+          <p:cNvSpPr>
+            <a:spLocks noGrp="1"/>
+          </p:cNvSpPr>
+          <p:nvPr>
+            <p:ph type="sldNum" sz="quarter" idx="12"/>
+          </p:nvPr>
+        </p:nvSpPr>
+        <p:spPr/>
+        <p:txBody>
+          <a:bodyPr/>
+          <a:lstStyle/>
+          <a:p>
+            <a:pPr>
+              <a:defRPr/>
+            </a:pPr>
+            <a:fld id="{CE265BFB-70D1-4552-B9D1-2665EEDC3C5E}" type="slidenum">
+              <a:rPr lang="de-DE" noProof="0" smtClean="0"/>
+              <a:pPr>
+                <a:defRPr/>
+              </a:pPr>
+              <a:t>14</a:t>
+            </a:fld>
+            <a:endParaRPr lang="de-DE" noProof="0"/>
+          </a:p>
+        </p:txBody>
+      </p:sp>
+      <p:sp>
+        <p:nvSpPr>
+          <p:cNvPr id="5" name="Text Placeholder 4">
+            <a:extLst>
+              <a:ext uri="{FF2B5EF4-FFF2-40B4-BE49-F238E27FC236}">
+                <a16:creationId xmlns:a16="http://schemas.microsoft.com/office/drawing/2014/main" id="{3C1E4A41-CA6F-486A-9808-FBAA2921FAD7}"/>
+              </a:ext>
+            </a:extLst>
+          </p:cNvPr>
+          <p:cNvSpPr>
+            <a:spLocks noGrp="1"/>
+          </p:cNvSpPr>
+          <p:nvPr>
+            <p:ph type="body" sz="quarter" idx="13"/>
+          </p:nvPr>
+        </p:nvSpPr>
+        <p:spPr/>
+        <p:txBody>
+          <a:bodyPr/>
+          <a:lstStyle/>
+          <a:p>
+            <a:endParaRPr lang="en-GB"/>
+          </a:p>
+        </p:txBody>
+      </p:sp>
+      <p:graphicFrame>
+        <p:nvGraphicFramePr>
+          <p:cNvPr id="6" name="Table 5">
+            <a:extLst>
+              <a:ext uri="{FF2B5EF4-FFF2-40B4-BE49-F238E27FC236}">
+                <a16:creationId xmlns:a16="http://schemas.microsoft.com/office/drawing/2014/main" id="{ED74393B-8713-43E6-B7E5-D4D5E1E030B1}"/>
+              </a:ext>
+            </a:extLst>
+          </p:cNvPr>
+          <p:cNvGraphicFramePr>
+            <a:graphicFrameLocks noGrp="1"/>
+          </p:cNvGraphicFramePr>
+          <p:nvPr>
+            <p:extLst>
+              <p:ext uri="{D42A27DB-BD31-4B8C-83A1-F6EECF244321}">
+                <p14:modId xmlns:p14="http://schemas.microsoft.com/office/powerpoint/2010/main" val="3270860894"/>
+              </p:ext>
+            </p:extLst>
+          </p:nvPr>
+        </p:nvGraphicFramePr>
+        <p:xfrm>
+          <a:off x="358775" y="1919664"/>
+          <a:ext cx="8421688" cy="860910"/>
+        </p:xfrm>
+        <a:graphic>
+          <a:graphicData uri="http://schemas.openxmlformats.org/drawingml/2006/table">
+            <a:tbl>
+              <a:tblPr firstRow="1" bandRow="1">
+                <a:tableStyleId>{D27102A9-8310-4765-A935-A1911B00CA55}</a:tableStyleId>
+              </a:tblPr>
+              <a:tblGrid>
+                <a:gridCol w="4210844">
+                  <a:extLst>
+                    <a:ext uri="{9D8B030D-6E8A-4147-A177-3AD203B41FA5}">
+                      <a16:colId xmlns:a16="http://schemas.microsoft.com/office/drawing/2014/main" val="611615417"/>
+                    </a:ext>
+                  </a:extLst>
+                </a:gridCol>
+                <a:gridCol w="4210844">
+                  <a:extLst>
+                    <a:ext uri="{9D8B030D-6E8A-4147-A177-3AD203B41FA5}">
+                      <a16:colId xmlns:a16="http://schemas.microsoft.com/office/drawing/2014/main" val="3473250681"/>
+                    </a:ext>
+                  </a:extLst>
+                </a:gridCol>
+              </a:tblGrid>
+              <a:tr h="430455">
+                <a:tc>
+                  <a:txBody>
+                    <a:bodyPr/>
+                    <a:lstStyle/>
+                    <a:p>
+                      <a:pPr algn="ctr"/>
+                      <a:r>
+                        <a:rPr lang="en-GB" dirty="0"/>
+                        <a:t>Machine Learning</a:t>
+                      </a:r>
+                    </a:p>
+                  </a:txBody>
+                  <a:tcPr/>
+                </a:tc>
+                <a:tc>
+                  <a:txBody>
+                    <a:bodyPr/>
+                    <a:lstStyle/>
+                    <a:p>
+                      <a:pPr algn="ctr"/>
+                      <a:r>
+                        <a:rPr lang="en-GB" dirty="0"/>
+                        <a:t>Deep Learning</a:t>
+                      </a:r>
+                    </a:p>
+                  </a:txBody>
+                  <a:tcPr/>
+                </a:tc>
+                <a:extLst>
+                  <a:ext uri="{0D108BD9-81ED-4DB2-BD59-A6C34878D82A}">
+                    <a16:rowId xmlns:a16="http://schemas.microsoft.com/office/drawing/2014/main" val="4208449294"/>
+                  </a:ext>
+                </a:extLst>
+              </a:tr>
+              <a:tr h="430455">
+                <a:tc>
+                  <a:txBody>
+                    <a:bodyPr/>
+                    <a:lstStyle/>
+                    <a:p>
+                      <a:pPr algn="ctr"/>
+                      <a:r>
+                        <a:rPr lang="en-GB" dirty="0"/>
+                        <a:t>Manual feature extraction</a:t>
+                      </a:r>
+                    </a:p>
+                  </a:txBody>
+                  <a:tcPr/>
+                </a:tc>
+                <a:tc>
+                  <a:txBody>
+                    <a:bodyPr/>
+                    <a:lstStyle/>
+                    <a:p>
+                      <a:pPr algn="ctr"/>
+                      <a:r>
+                        <a:rPr lang="en-GB" dirty="0"/>
+                        <a:t>NN extracts features</a:t>
+                      </a:r>
+                    </a:p>
+                  </a:txBody>
+                  <a:tcPr/>
+                </a:tc>
+                <a:extLst>
+                  <a:ext uri="{0D108BD9-81ED-4DB2-BD59-A6C34878D82A}">
+                    <a16:rowId xmlns:a16="http://schemas.microsoft.com/office/drawing/2014/main" val="3033901505"/>
+                  </a:ext>
+                </a:extLst>
+              </a:tr>
+            </a:tbl>
+          </a:graphicData>
+        </a:graphic>
+      </p:graphicFrame>
+    </p:spTree>
+    <p:extLst>
+      <p:ext uri="{BB962C8B-B14F-4D97-AF65-F5344CB8AC3E}">
+        <p14:creationId xmlns:p14="http://schemas.microsoft.com/office/powerpoint/2010/main" val="4188308456"/>
+      </p:ext>
+    </p:extLst>
+  </p:cSld>
+  <p:clrMapOvr>
+    <a:masterClrMapping/>
+  </p:clrMapOvr>
+</p:sld>
+</file>
+
+<file path=ppt/slides/slide15.xml><?xml version="1.0" encoding="utf-8"?>
+<p:sld xmlns:a="http://schemas.openxmlformats.org/drawingml/2006/main" xmlns:r="http://schemas.openxmlformats.org/officeDocument/2006/relationships" xmlns:p="http://schemas.openxmlformats.org/presentationml/2006/main">
+  <p:cSld>
+    <p:spTree>
+      <p:nvGrpSpPr>
+        <p:cNvPr id="1" name=""/>
+        <p:cNvGrpSpPr/>
+        <p:nvPr/>
+      </p:nvGrpSpPr>
+      <p:grpSpPr>
+        <a:xfrm>
+          <a:off x="0" y="0"/>
+          <a:ext cx="0" cy="0"/>
+          <a:chOff x="0" y="0"/>
+          <a:chExt cx="0" cy="0"/>
+        </a:xfrm>
+      </p:grpSpPr>
+      <p:sp>
+        <p:nvSpPr>
+          <p:cNvPr id="2" name="Title 1">
+            <a:extLst>
+              <a:ext uri="{FF2B5EF4-FFF2-40B4-BE49-F238E27FC236}">
                 <a16:creationId xmlns:a16="http://schemas.microsoft.com/office/drawing/2014/main" id="{5D26EE34-CEF9-49DF-A25C-AD50F417BF74}"/>
               </a:ext>
             </a:extLst>
@@ -15588,7 +16202,7 @@
               <a:pPr>
                 <a:defRPr/>
               </a:pPr>
-              <a:t>14</a:t>
+              <a:t>15</a:t>
             </a:fld>
             <a:endParaRPr lang="de-DE" noProof="0"/>
           </a:p>
@@ -16242,7 +16856,7 @@
 </p:sld>
 </file>
 
-<file path=ppt/slides/slide15.xml><?xml version="1.0" encoding="utf-8"?>
+<file path=ppt/slides/slide16.xml><?xml version="1.0" encoding="utf-8"?>
 <p:sld xmlns:a="http://schemas.openxmlformats.org/drawingml/2006/main" xmlns:r="http://schemas.openxmlformats.org/officeDocument/2006/relationships" xmlns:p="http://schemas.openxmlformats.org/presentationml/2006/main">
   <p:cSld>
     <p:spTree>
@@ -16351,7 +16965,7 @@
               <a:pPr>
                 <a:defRPr/>
               </a:pPr>
-              <a:t>15</a:t>
+              <a:t>16</a:t>
             </a:fld>
             <a:endParaRPr lang="de-DE" noProof="0"/>
           </a:p>
@@ -16428,7 +17042,7 @@
 </p:sld>
 </file>
 
-<file path=ppt/slides/slide16.xml><?xml version="1.0" encoding="utf-8"?>
+<file path=ppt/slides/slide17.xml><?xml version="1.0" encoding="utf-8"?>
 <p:sld xmlns:a="http://schemas.openxmlformats.org/drawingml/2006/main" xmlns:r="http://schemas.openxmlformats.org/officeDocument/2006/relationships" xmlns:p="http://schemas.openxmlformats.org/presentationml/2006/main">
   <p:cSld>
     <p:spTree>
@@ -16532,7 +17146,7 @@
               <a:pPr>
                 <a:defRPr/>
               </a:pPr>
-              <a:t>16</a:t>
+              <a:t>17</a:t>
             </a:fld>
             <a:endParaRPr lang="de-DE" noProof="0"/>
           </a:p>
@@ -16551,7 +17165,7 @@
 </p:sld>
 </file>
 
-<file path=ppt/slides/slide17.xml><?xml version="1.0" encoding="utf-8"?>
+<file path=ppt/slides/slide18.xml><?xml version="1.0" encoding="utf-8"?>
 <p:sld xmlns:a="http://schemas.openxmlformats.org/drawingml/2006/main" xmlns:r="http://schemas.openxmlformats.org/officeDocument/2006/relationships" xmlns:p="http://schemas.openxmlformats.org/presentationml/2006/main">
   <p:cSld>
     <p:spTree>
@@ -16756,7 +17370,7 @@
               <a:pPr>
                 <a:defRPr/>
               </a:pPr>
-              <a:t>17</a:t>
+              <a:t>18</a:t>
             </a:fld>
             <a:endParaRPr lang="de-DE" noProof="0"/>
           </a:p>
@@ -16998,7 +17612,7 @@
 </p:sld>
 </file>
 
-<file path=ppt/slides/slide18.xml><?xml version="1.0" encoding="utf-8"?>
+<file path=ppt/slides/slide19.xml><?xml version="1.0" encoding="utf-8"?>
 <p:sld xmlns:a="http://schemas.openxmlformats.org/drawingml/2006/main" xmlns:r="http://schemas.openxmlformats.org/officeDocument/2006/relationships" xmlns:p="http://schemas.openxmlformats.org/presentationml/2006/main">
   <p:cSld>
     <p:spTree>
@@ -17043,8 +17657,8 @@
           </a:p>
         </p:txBody>
       </p:sp>
-      <mc:AlternateContent xmlns:mc="http://schemas.openxmlformats.org/markup-compatibility/2006">
-        <mc:Choice xmlns:a14="http://schemas.microsoft.com/office/drawing/2010/main" Requires="a14">
+      <mc:AlternateContent xmlns:mc="http://schemas.openxmlformats.org/markup-compatibility/2006" xmlns:a14="http://schemas.microsoft.com/office/drawing/2010/main">
+        <mc:Choice Requires="a14">
           <p:sp>
             <p:nvSpPr>
               <p:cNvPr id="3" name="Content Placeholder 2">
@@ -17246,13 +17860,7 @@
                       <a:rPr lang="en-GB" sz="2000" b="0" i="1" smtClean="0">
                         <a:latin typeface="Cambria Math" panose="02040503050406030204" pitchFamily="18" charset="0"/>
                       </a:rPr>
-                      <m:t>=</m:t>
-                    </m:r>
-                    <m:r>
-                      <a:rPr lang="en-GB" sz="2000" b="0" i="1" smtClean="0">
-                        <a:latin typeface="Cambria Math" panose="02040503050406030204" pitchFamily="18" charset="0"/>
-                      </a:rPr>
-                      <m:t>0</m:t>
+                      <m:t>=0</m:t>
                     </m:r>
                   </m:oMath>
                 </a14:m>
@@ -17272,13 +17880,7 @@
                       <a:rPr lang="en-GB" sz="2000" b="0" i="1" smtClean="0">
                         <a:latin typeface="Cambria Math" panose="02040503050406030204" pitchFamily="18" charset="0"/>
                       </a:rPr>
-                      <m:t>=</m:t>
-                    </m:r>
-                    <m:r>
-                      <a:rPr lang="en-GB" sz="2000" b="0" i="1" smtClean="0">
-                        <a:latin typeface="Cambria Math" panose="02040503050406030204" pitchFamily="18" charset="0"/>
-                      </a:rPr>
-                      <m:t>1</m:t>
+                      <m:t>=1</m:t>
                     </m:r>
                   </m:oMath>
                 </a14:m>
@@ -17632,16 +18234,7 @@
                           <a:rPr lang="en-GB" sz="2000" b="0" i="1" smtClean="0">
                             <a:latin typeface="Cambria Math" panose="02040503050406030204" pitchFamily="18" charset="0"/>
                           </a:rPr>
-                          <m:t>=</m:t>
-                        </m:r>
-                        <m:r>
-                          <m:rPr>
-                            <m:brk m:alnAt="23"/>
-                          </m:rPr>
-                          <a:rPr lang="en-GB" sz="2000" b="0" i="1" smtClean="0">
-                            <a:latin typeface="Cambria Math" panose="02040503050406030204" pitchFamily="18" charset="0"/>
-                          </a:rPr>
-                          <m:t>1</m:t>
+                          <m:t>=1</m:t>
                         </m:r>
                       </m:sub>
                       <m:sup>
@@ -18345,7 +18938,7 @@
             </p:txBody>
           </p:sp>
         </mc:Choice>
-        <mc:Fallback>
+        <mc:Fallback xmlns="">
           <p:sp>
             <p:nvSpPr>
               <p:cNvPr id="3" name="Content Placeholder 2">
@@ -18414,7 +19007,7 @@
               <a:pPr>
                 <a:defRPr/>
               </a:pPr>
-              <a:t>18</a:t>
+              <a:t>19</a:t>
             </a:fld>
             <a:endParaRPr lang="de-DE" noProof="0"/>
           </a:p>
@@ -18498,7 +19091,7 @@
           <a:p>
             <a:r>
               <a:rPr lang="en-GB" dirty="0"/>
-              <a:t>Contents</a:t>
+              <a:t>Agenda</a:t>
             </a:r>
           </a:p>
         </p:txBody>
@@ -19894,8 +20487,8 @@
           </a:p>
         </p:txBody>
       </p:sp>
-      <mc:AlternateContent xmlns:mc="http://schemas.openxmlformats.org/markup-compatibility/2006">
-        <mc:Choice xmlns:a14="http://schemas.microsoft.com/office/drawing/2010/main" Requires="a14">
+      <mc:AlternateContent xmlns:mc="http://schemas.openxmlformats.org/markup-compatibility/2006" xmlns:a14="http://schemas.microsoft.com/office/drawing/2010/main">
+        <mc:Choice Requires="a14">
           <p:sp>
             <p:nvSpPr>
               <p:cNvPr id="46" name="TextBox 45">
@@ -19987,7 +20580,7 @@
             </p:txBody>
           </p:sp>
         </mc:Choice>
-        <mc:Fallback>
+        <mc:Fallback xmlns="">
           <p:sp>
             <p:nvSpPr>
               <p:cNvPr id="46" name="TextBox 45">
@@ -20631,14 +21224,26 @@
           <a:p>
             <a:pPr marL="461963" lvl="1" indent="-285750"/>
             <a:r>
-              <a:rPr lang="en-GB" sz="3000" dirty="0"/>
+              <a:rPr lang="en-GB" sz="3000" dirty="0">
+                <a:solidFill>
+                  <a:schemeClr val="bg1">
+                    <a:lumMod val="65000"/>
+                  </a:schemeClr>
+                </a:solidFill>
+              </a:rPr>
               <a:t>Recurrent NN</a:t>
             </a:r>
           </a:p>
           <a:p>
             <a:pPr marL="461963" lvl="1" indent="-285750"/>
             <a:r>
-              <a:rPr lang="en-GB" sz="3000" dirty="0"/>
+              <a:rPr lang="en-GB" sz="3000" dirty="0">
+                <a:solidFill>
+                  <a:schemeClr val="bg1">
+                    <a:lumMod val="65000"/>
+                  </a:schemeClr>
+                </a:solidFill>
+              </a:rPr>
               <a:t>Stacked Auto Encoder</a:t>
             </a:r>
           </a:p>
@@ -20717,11 +21322,7 @@
             <a:graphicFrameLocks noGrp="1"/>
           </p:cNvGraphicFramePr>
           <p:nvPr>
-            <p:extLst>
-              <p:ext uri="{D42A27DB-BD31-4B8C-83A1-F6EECF244321}">
-                <p14:modId xmlns:p14="http://schemas.microsoft.com/office/powerpoint/2010/main" val="3270860894"/>
-              </p:ext>
-            </p:extLst>
+            <p:extLst/>
           </p:nvPr>
         </p:nvGraphicFramePr>
         <p:xfrm>
@@ -20827,7 +21428,7 @@
     </p:spTree>
     <p:extLst>
       <p:ext uri="{BB962C8B-B14F-4D97-AF65-F5344CB8AC3E}">
-        <p14:creationId xmlns:p14="http://schemas.microsoft.com/office/powerpoint/2010/main" val="4188308456"/>
+        <p14:creationId xmlns:p14="http://schemas.microsoft.com/office/powerpoint/2010/main" val="3567389825"/>
       </p:ext>
     </p:extLst>
   </p:cSld>
@@ -20955,31 +21556,714 @@
           </a:p>
         </p:txBody>
       </p:sp>
-      <p:sp>
-        <p:nvSpPr>
-          <p:cNvPr id="5" name="Text Placeholder 4">
-            <a:extLst>
-              <a:ext uri="{FF2B5EF4-FFF2-40B4-BE49-F238E27FC236}">
-                <a16:creationId xmlns:a16="http://schemas.microsoft.com/office/drawing/2014/main" id="{4B2AD24F-8AD3-4B1A-95B7-5B9B6D1E3681}"/>
-              </a:ext>
-            </a:extLst>
-          </p:cNvPr>
-          <p:cNvSpPr>
-            <a:spLocks noGrp="1"/>
-          </p:cNvSpPr>
-          <p:nvPr>
-            <p:ph type="body" sz="quarter" idx="13"/>
-          </p:nvPr>
-        </p:nvSpPr>
-        <p:spPr/>
-        <p:txBody>
-          <a:bodyPr/>
-          <a:lstStyle/>
-          <a:p>
-            <a:endParaRPr lang="en-GB"/>
-          </a:p>
-        </p:txBody>
-      </p:sp>
+      <mc:AlternateContent xmlns:mc="http://schemas.openxmlformats.org/markup-compatibility/2006" xmlns:a14="http://schemas.microsoft.com/office/drawing/2010/main">
+        <mc:Choice Requires="a14">
+          <p:sp>
+            <p:nvSpPr>
+              <p:cNvPr id="3" name="TextBox 2">
+                <a:extLst>
+                  <a:ext uri="{FF2B5EF4-FFF2-40B4-BE49-F238E27FC236}">
+                    <a16:creationId xmlns:a16="http://schemas.microsoft.com/office/drawing/2014/main" id="{BA6E5770-FE0B-4066-A6C6-6C333370AEC0}"/>
+                  </a:ext>
+                </a:extLst>
+              </p:cNvPr>
+              <p:cNvSpPr txBox="1"/>
+              <p:nvPr/>
+            </p:nvSpPr>
+            <p:spPr>
+              <a:xfrm>
+                <a:off x="5454869" y="5218387"/>
+                <a:ext cx="3325594" cy="461665"/>
+              </a:xfrm>
+              <a:prstGeom prst="rect">
+                <a:avLst/>
+              </a:prstGeom>
+              <a:noFill/>
+            </p:spPr>
+            <p:txBody>
+              <a:bodyPr wrap="square" rtlCol="0">
+                <a:spAutoFit/>
+              </a:bodyPr>
+              <a:lstStyle/>
+              <a:p>
+                <a:pPr/>
+                <a14:m>
+                  <m:oMathPara xmlns:m="http://schemas.openxmlformats.org/officeDocument/2006/math">
+                    <m:oMathParaPr>
+                      <m:jc m:val="centerGroup"/>
+                    </m:oMathParaPr>
+                    <m:oMath xmlns:m="http://schemas.openxmlformats.org/officeDocument/2006/math">
+                      <m:r>
+                        <a:rPr lang="en-GB" sz="2400" b="0" i="1" smtClean="0">
+                          <a:latin typeface="Cambria Math" panose="02040503050406030204" pitchFamily="18" charset="0"/>
+                        </a:rPr>
+                        <m:t>𝑒</m:t>
+                      </m:r>
+                      <m:d>
+                        <m:dPr>
+                          <m:ctrlPr>
+                            <a:rPr lang="en-GB" sz="2400" b="0" i="1" smtClean="0">
+                              <a:latin typeface="Cambria Math" panose="02040503050406030204" pitchFamily="18" charset="0"/>
+                            </a:rPr>
+                          </m:ctrlPr>
+                        </m:dPr>
+                        <m:e>
+                          <m:r>
+                            <a:rPr lang="en-GB" sz="2400" b="0" i="1" smtClean="0">
+                              <a:latin typeface="Cambria Math" panose="02040503050406030204" pitchFamily="18" charset="0"/>
+                            </a:rPr>
+                            <m:t>𝑛</m:t>
+                          </m:r>
+                        </m:e>
+                      </m:d>
+                      <m:r>
+                        <a:rPr lang="en-GB" sz="2400" b="0" i="1" smtClean="0">
+                          <a:latin typeface="Cambria Math" panose="02040503050406030204" pitchFamily="18" charset="0"/>
+                        </a:rPr>
+                        <m:t>=</m:t>
+                      </m:r>
+                      <m:r>
+                        <a:rPr lang="en-GB" sz="2400" b="0" i="1" smtClean="0">
+                          <a:latin typeface="Cambria Math" panose="02040503050406030204" pitchFamily="18" charset="0"/>
+                        </a:rPr>
+                        <m:t>𝑑</m:t>
+                      </m:r>
+                      <m:d>
+                        <m:dPr>
+                          <m:ctrlPr>
+                            <a:rPr lang="en-GB" sz="2400" b="0" i="1" smtClean="0">
+                              <a:latin typeface="Cambria Math" panose="02040503050406030204" pitchFamily="18" charset="0"/>
+                            </a:rPr>
+                          </m:ctrlPr>
+                        </m:dPr>
+                        <m:e>
+                          <m:r>
+                            <a:rPr lang="en-GB" sz="2400" b="0" i="1" smtClean="0">
+                              <a:latin typeface="Cambria Math" panose="02040503050406030204" pitchFamily="18" charset="0"/>
+                            </a:rPr>
+                            <m:t>𝑛</m:t>
+                          </m:r>
+                        </m:e>
+                      </m:d>
+                      <m:r>
+                        <a:rPr lang="en-GB" sz="2400" b="0" i="1" smtClean="0">
+                          <a:latin typeface="Cambria Math" panose="02040503050406030204" pitchFamily="18" charset="0"/>
+                        </a:rPr>
+                        <m:t>−</m:t>
+                      </m:r>
+                      <m:r>
+                        <a:rPr lang="en-GB" sz="2400" b="0" i="1" smtClean="0">
+                          <a:latin typeface="Cambria Math" panose="02040503050406030204" pitchFamily="18" charset="0"/>
+                        </a:rPr>
+                        <m:t>𝑦</m:t>
+                      </m:r>
+                      <m:r>
+                        <a:rPr lang="en-GB" sz="2400" b="0" i="1" smtClean="0">
+                          <a:latin typeface="Cambria Math" panose="02040503050406030204" pitchFamily="18" charset="0"/>
+                        </a:rPr>
+                        <m:t>(</m:t>
+                      </m:r>
+                      <m:r>
+                        <a:rPr lang="en-GB" sz="2400" b="0" i="1" smtClean="0">
+                          <a:latin typeface="Cambria Math" panose="02040503050406030204" pitchFamily="18" charset="0"/>
+                        </a:rPr>
+                        <m:t>𝑛</m:t>
+                      </m:r>
+                      <m:r>
+                        <a:rPr lang="en-GB" sz="2400" b="0" i="1" smtClean="0">
+                          <a:latin typeface="Cambria Math" panose="02040503050406030204" pitchFamily="18" charset="0"/>
+                        </a:rPr>
+                        <m:t>)</m:t>
+                      </m:r>
+                    </m:oMath>
+                  </m:oMathPara>
+                </a14:m>
+                <a:endParaRPr lang="en-GB" sz="2400" dirty="0" err="1"/>
+              </a:p>
+            </p:txBody>
+          </p:sp>
+        </mc:Choice>
+        <mc:Fallback xmlns="">
+          <p:sp>
+            <p:nvSpPr>
+              <p:cNvPr id="3" name="TextBox 2">
+                <a:extLst>
+                  <a:ext uri="{FF2B5EF4-FFF2-40B4-BE49-F238E27FC236}">
+                    <a16:creationId xmlns:a16="http://schemas.microsoft.com/office/drawing/2014/main" id="{BA6E5770-FE0B-4066-A6C6-6C333370AEC0}"/>
+                  </a:ext>
+                </a:extLst>
+              </p:cNvPr>
+              <p:cNvSpPr txBox="1">
+                <a:spLocks noRot="1" noChangeAspect="1" noMove="1" noResize="1" noEditPoints="1" noAdjustHandles="1" noChangeArrowheads="1" noChangeShapeType="1" noTextEdit="1"/>
+              </p:cNvSpPr>
+              <p:nvPr/>
+            </p:nvSpPr>
+            <p:spPr>
+              <a:xfrm>
+                <a:off x="5454869" y="5218387"/>
+                <a:ext cx="3325594" cy="461665"/>
+              </a:xfrm>
+              <a:prstGeom prst="rect">
+                <a:avLst/>
+              </a:prstGeom>
+              <a:blipFill>
+                <a:blip r:embed="rId5"/>
+                <a:stretch>
+                  <a:fillRect b="-19737"/>
+                </a:stretch>
+              </a:blipFill>
+            </p:spPr>
+            <p:txBody>
+              <a:bodyPr/>
+              <a:lstStyle/>
+              <a:p>
+                <a:r>
+                  <a:rPr lang="en-GB">
+                    <a:noFill/>
+                  </a:rPr>
+                  <a:t> </a:t>
+                </a:r>
+              </a:p>
+            </p:txBody>
+          </p:sp>
+        </mc:Fallback>
+      </mc:AlternateContent>
+      <mc:AlternateContent xmlns:mc="http://schemas.openxmlformats.org/markup-compatibility/2006" xmlns:a14="http://schemas.microsoft.com/office/drawing/2010/main">
+        <mc:Choice Requires="a14">
+          <p:sp>
+            <p:nvSpPr>
+              <p:cNvPr id="6" name="TextBox 5">
+                <a:extLst>
+                  <a:ext uri="{FF2B5EF4-FFF2-40B4-BE49-F238E27FC236}">
+                    <a16:creationId xmlns:a16="http://schemas.microsoft.com/office/drawing/2014/main" id="{F66C91F3-3B22-4ED9-B1E8-6257F084DBA3}"/>
+                  </a:ext>
+                </a:extLst>
+              </p:cNvPr>
+              <p:cNvSpPr txBox="1"/>
+              <p:nvPr/>
+            </p:nvSpPr>
+            <p:spPr>
+              <a:xfrm>
+                <a:off x="1174570" y="3263462"/>
+                <a:ext cx="630173" cy="523220"/>
+              </a:xfrm>
+              <a:prstGeom prst="rect">
+                <a:avLst/>
+              </a:prstGeom>
+              <a:noFill/>
+            </p:spPr>
+            <p:txBody>
+              <a:bodyPr wrap="none" rtlCol="0">
+                <a:spAutoFit/>
+              </a:bodyPr>
+              <a:lstStyle/>
+              <a:p>
+                <a:pPr/>
+                <a14:m>
+                  <m:oMathPara xmlns:m="http://schemas.openxmlformats.org/officeDocument/2006/math">
+                    <m:oMathParaPr>
+                      <m:jc m:val="centerGroup"/>
+                    </m:oMathParaPr>
+                    <m:oMath xmlns:m="http://schemas.openxmlformats.org/officeDocument/2006/math">
+                      <m:sSub>
+                        <m:sSubPr>
+                          <m:ctrlPr>
+                            <a:rPr lang="en-GB" sz="2800" b="0" i="1" smtClean="0">
+                              <a:latin typeface="Cambria Math" panose="02040503050406030204" pitchFamily="18" charset="0"/>
+                            </a:rPr>
+                          </m:ctrlPr>
+                        </m:sSubPr>
+                        <m:e>
+                          <m:r>
+                            <a:rPr lang="en-GB" sz="2800" b="0" i="1" smtClean="0">
+                              <a:latin typeface="Cambria Math" panose="02040503050406030204" pitchFamily="18" charset="0"/>
+                            </a:rPr>
+                            <m:t>𝑥</m:t>
+                          </m:r>
+                        </m:e>
+                        <m:sub>
+                          <m:r>
+                            <a:rPr lang="en-GB" sz="2800" b="0" i="1" smtClean="0">
+                              <a:latin typeface="Cambria Math" panose="02040503050406030204" pitchFamily="18" charset="0"/>
+                            </a:rPr>
+                            <m:t>1</m:t>
+                          </m:r>
+                        </m:sub>
+                      </m:sSub>
+                    </m:oMath>
+                  </m:oMathPara>
+                </a14:m>
+                <a:endParaRPr lang="en-GB" sz="1400" dirty="0" err="1"/>
+              </a:p>
+            </p:txBody>
+          </p:sp>
+        </mc:Choice>
+        <mc:Fallback xmlns="">
+          <p:sp>
+            <p:nvSpPr>
+              <p:cNvPr id="6" name="TextBox 5">
+                <a:extLst>
+                  <a:ext uri="{FF2B5EF4-FFF2-40B4-BE49-F238E27FC236}">
+                    <a16:creationId xmlns:a16="http://schemas.microsoft.com/office/drawing/2014/main" id="{F66C91F3-3B22-4ED9-B1E8-6257F084DBA3}"/>
+                  </a:ext>
+                </a:extLst>
+              </p:cNvPr>
+              <p:cNvSpPr txBox="1">
+                <a:spLocks noRot="1" noChangeAspect="1" noMove="1" noResize="1" noEditPoints="1" noAdjustHandles="1" noChangeArrowheads="1" noChangeShapeType="1" noTextEdit="1"/>
+              </p:cNvSpPr>
+              <p:nvPr/>
+            </p:nvSpPr>
+            <p:spPr>
+              <a:xfrm>
+                <a:off x="1174570" y="3263462"/>
+                <a:ext cx="630173" cy="523220"/>
+              </a:xfrm>
+              <a:prstGeom prst="rect">
+                <a:avLst/>
+              </a:prstGeom>
+              <a:blipFill>
+                <a:blip r:embed="rId6"/>
+                <a:stretch>
+                  <a:fillRect/>
+                </a:stretch>
+              </a:blipFill>
+            </p:spPr>
+            <p:txBody>
+              <a:bodyPr/>
+              <a:lstStyle/>
+              <a:p>
+                <a:r>
+                  <a:rPr lang="en-GB">
+                    <a:noFill/>
+                  </a:rPr>
+                  <a:t> </a:t>
+                </a:r>
+              </a:p>
+            </p:txBody>
+          </p:sp>
+        </mc:Fallback>
+      </mc:AlternateContent>
+      <mc:AlternateContent xmlns:mc="http://schemas.openxmlformats.org/markup-compatibility/2006" xmlns:a14="http://schemas.microsoft.com/office/drawing/2010/main">
+        <mc:Choice Requires="a14">
+          <p:sp>
+            <p:nvSpPr>
+              <p:cNvPr id="8" name="TextBox 7">
+                <a:extLst>
+                  <a:ext uri="{FF2B5EF4-FFF2-40B4-BE49-F238E27FC236}">
+                    <a16:creationId xmlns:a16="http://schemas.microsoft.com/office/drawing/2014/main" id="{97F79473-25C4-4348-9DDA-B8EF8471683C}"/>
+                  </a:ext>
+                </a:extLst>
+              </p:cNvPr>
+              <p:cNvSpPr txBox="1"/>
+              <p:nvPr/>
+            </p:nvSpPr>
+            <p:spPr>
+              <a:xfrm>
+                <a:off x="1174570" y="4562630"/>
+                <a:ext cx="638445" cy="523220"/>
+              </a:xfrm>
+              <a:prstGeom prst="rect">
+                <a:avLst/>
+              </a:prstGeom>
+              <a:noFill/>
+            </p:spPr>
+            <p:txBody>
+              <a:bodyPr wrap="none" rtlCol="0">
+                <a:spAutoFit/>
+              </a:bodyPr>
+              <a:lstStyle/>
+              <a:p>
+                <a:pPr/>
+                <a14:m>
+                  <m:oMathPara xmlns:m="http://schemas.openxmlformats.org/officeDocument/2006/math">
+                    <m:oMathParaPr>
+                      <m:jc m:val="centerGroup"/>
+                    </m:oMathParaPr>
+                    <m:oMath xmlns:m="http://schemas.openxmlformats.org/officeDocument/2006/math">
+                      <m:sSub>
+                        <m:sSubPr>
+                          <m:ctrlPr>
+                            <a:rPr lang="en-GB" sz="2800" b="0" i="1" smtClean="0">
+                              <a:latin typeface="Cambria Math" panose="02040503050406030204" pitchFamily="18" charset="0"/>
+                            </a:rPr>
+                          </m:ctrlPr>
+                        </m:sSubPr>
+                        <m:e>
+                          <m:r>
+                            <a:rPr lang="en-GB" sz="2800" b="0" i="1" smtClean="0">
+                              <a:latin typeface="Cambria Math" panose="02040503050406030204" pitchFamily="18" charset="0"/>
+                            </a:rPr>
+                            <m:t>𝑥</m:t>
+                          </m:r>
+                        </m:e>
+                        <m:sub>
+                          <m:r>
+                            <a:rPr lang="en-GB" sz="2800" b="0" i="1" smtClean="0">
+                              <a:latin typeface="Cambria Math" panose="02040503050406030204" pitchFamily="18" charset="0"/>
+                            </a:rPr>
+                            <m:t>3</m:t>
+                          </m:r>
+                        </m:sub>
+                      </m:sSub>
+                    </m:oMath>
+                  </m:oMathPara>
+                </a14:m>
+                <a:endParaRPr lang="en-GB" sz="1400" dirty="0" err="1"/>
+              </a:p>
+            </p:txBody>
+          </p:sp>
+        </mc:Choice>
+        <mc:Fallback xmlns="">
+          <p:sp>
+            <p:nvSpPr>
+              <p:cNvPr id="8" name="TextBox 7">
+                <a:extLst>
+                  <a:ext uri="{FF2B5EF4-FFF2-40B4-BE49-F238E27FC236}">
+                    <a16:creationId xmlns:a16="http://schemas.microsoft.com/office/drawing/2014/main" id="{97F79473-25C4-4348-9DDA-B8EF8471683C}"/>
+                  </a:ext>
+                </a:extLst>
+              </p:cNvPr>
+              <p:cNvSpPr txBox="1">
+                <a:spLocks noRot="1" noChangeAspect="1" noMove="1" noResize="1" noEditPoints="1" noAdjustHandles="1" noChangeArrowheads="1" noChangeShapeType="1" noTextEdit="1"/>
+              </p:cNvSpPr>
+              <p:nvPr/>
+            </p:nvSpPr>
+            <p:spPr>
+              <a:xfrm>
+                <a:off x="1174570" y="4562630"/>
+                <a:ext cx="638445" cy="523220"/>
+              </a:xfrm>
+              <a:prstGeom prst="rect">
+                <a:avLst/>
+              </a:prstGeom>
+              <a:blipFill>
+                <a:blip r:embed="rId7"/>
+                <a:stretch>
+                  <a:fillRect/>
+                </a:stretch>
+              </a:blipFill>
+            </p:spPr>
+            <p:txBody>
+              <a:bodyPr/>
+              <a:lstStyle/>
+              <a:p>
+                <a:r>
+                  <a:rPr lang="en-GB">
+                    <a:noFill/>
+                  </a:rPr>
+                  <a:t> </a:t>
+                </a:r>
+              </a:p>
+            </p:txBody>
+          </p:sp>
+        </mc:Fallback>
+      </mc:AlternateContent>
+      <mc:AlternateContent xmlns:mc="http://schemas.openxmlformats.org/markup-compatibility/2006" xmlns:a14="http://schemas.microsoft.com/office/drawing/2010/main">
+        <mc:Choice Requires="a14">
+          <p:sp>
+            <p:nvSpPr>
+              <p:cNvPr id="10" name="TextBox 9">
+                <a:extLst>
+                  <a:ext uri="{FF2B5EF4-FFF2-40B4-BE49-F238E27FC236}">
+                    <a16:creationId xmlns:a16="http://schemas.microsoft.com/office/drawing/2014/main" id="{A0E00179-AE0E-433F-B5F7-DA1B63420684}"/>
+                  </a:ext>
+                </a:extLst>
+              </p:cNvPr>
+              <p:cNvSpPr txBox="1"/>
+              <p:nvPr/>
+            </p:nvSpPr>
+            <p:spPr>
+              <a:xfrm>
+                <a:off x="1127721" y="3913046"/>
+                <a:ext cx="638445" cy="523220"/>
+              </a:xfrm>
+              <a:prstGeom prst="rect">
+                <a:avLst/>
+              </a:prstGeom>
+              <a:noFill/>
+            </p:spPr>
+            <p:txBody>
+              <a:bodyPr wrap="none" rtlCol="0">
+                <a:spAutoFit/>
+              </a:bodyPr>
+              <a:lstStyle/>
+              <a:p>
+                <a:pPr/>
+                <a14:m>
+                  <m:oMathPara xmlns:m="http://schemas.openxmlformats.org/officeDocument/2006/math">
+                    <m:oMathParaPr>
+                      <m:jc m:val="centerGroup"/>
+                    </m:oMathParaPr>
+                    <m:oMath xmlns:m="http://schemas.openxmlformats.org/officeDocument/2006/math">
+                      <m:sSub>
+                        <m:sSubPr>
+                          <m:ctrlPr>
+                            <a:rPr lang="en-GB" sz="2800" b="0" i="1" smtClean="0">
+                              <a:latin typeface="Cambria Math" panose="02040503050406030204" pitchFamily="18" charset="0"/>
+                            </a:rPr>
+                          </m:ctrlPr>
+                        </m:sSubPr>
+                        <m:e>
+                          <m:r>
+                            <a:rPr lang="en-GB" sz="2800" b="0" i="1" smtClean="0">
+                              <a:latin typeface="Cambria Math" panose="02040503050406030204" pitchFamily="18" charset="0"/>
+                            </a:rPr>
+                            <m:t>𝑥</m:t>
+                          </m:r>
+                        </m:e>
+                        <m:sub>
+                          <m:r>
+                            <a:rPr lang="en-GB" sz="2800" b="0" i="1" smtClean="0">
+                              <a:latin typeface="Cambria Math" panose="02040503050406030204" pitchFamily="18" charset="0"/>
+                            </a:rPr>
+                            <m:t>2</m:t>
+                          </m:r>
+                        </m:sub>
+                      </m:sSub>
+                    </m:oMath>
+                  </m:oMathPara>
+                </a14:m>
+                <a:endParaRPr lang="en-GB" sz="1400" dirty="0" err="1"/>
+              </a:p>
+            </p:txBody>
+          </p:sp>
+        </mc:Choice>
+        <mc:Fallback xmlns="">
+          <p:sp>
+            <p:nvSpPr>
+              <p:cNvPr id="10" name="TextBox 9">
+                <a:extLst>
+                  <a:ext uri="{FF2B5EF4-FFF2-40B4-BE49-F238E27FC236}">
+                    <a16:creationId xmlns:a16="http://schemas.microsoft.com/office/drawing/2014/main" id="{A0E00179-AE0E-433F-B5F7-DA1B63420684}"/>
+                  </a:ext>
+                </a:extLst>
+              </p:cNvPr>
+              <p:cNvSpPr txBox="1">
+                <a:spLocks noRot="1" noChangeAspect="1" noMove="1" noResize="1" noEditPoints="1" noAdjustHandles="1" noChangeArrowheads="1" noChangeShapeType="1" noTextEdit="1"/>
+              </p:cNvSpPr>
+              <p:nvPr/>
+            </p:nvSpPr>
+            <p:spPr>
+              <a:xfrm>
+                <a:off x="1127721" y="3913046"/>
+                <a:ext cx="638445" cy="523220"/>
+              </a:xfrm>
+              <a:prstGeom prst="rect">
+                <a:avLst/>
+              </a:prstGeom>
+              <a:blipFill>
+                <a:blip r:embed="rId8"/>
+                <a:stretch>
+                  <a:fillRect/>
+                </a:stretch>
+              </a:blipFill>
+            </p:spPr>
+            <p:txBody>
+              <a:bodyPr/>
+              <a:lstStyle/>
+              <a:p>
+                <a:r>
+                  <a:rPr lang="en-GB">
+                    <a:noFill/>
+                  </a:rPr>
+                  <a:t> </a:t>
+                </a:r>
+              </a:p>
+            </p:txBody>
+          </p:sp>
+        </mc:Fallback>
+      </mc:AlternateContent>
+      <mc:AlternateContent xmlns:mc="http://schemas.openxmlformats.org/markup-compatibility/2006" xmlns:a14="http://schemas.microsoft.com/office/drawing/2010/main">
+        <mc:Choice Requires="a14">
+          <p:sp>
+            <p:nvSpPr>
+              <p:cNvPr id="11" name="TextBox 10">
+                <a:extLst>
+                  <a:ext uri="{FF2B5EF4-FFF2-40B4-BE49-F238E27FC236}">
+                    <a16:creationId xmlns:a16="http://schemas.microsoft.com/office/drawing/2014/main" id="{F3830371-EAA6-4614-87E7-B720386370C1}"/>
+                  </a:ext>
+                </a:extLst>
+              </p:cNvPr>
+              <p:cNvSpPr txBox="1"/>
+              <p:nvPr/>
+            </p:nvSpPr>
+            <p:spPr>
+              <a:xfrm>
+                <a:off x="1977089" y="5260258"/>
+                <a:ext cx="1910203" cy="1100558"/>
+              </a:xfrm>
+              <a:prstGeom prst="rect">
+                <a:avLst/>
+              </a:prstGeom>
+              <a:noFill/>
+            </p:spPr>
+            <p:txBody>
+              <a:bodyPr wrap="none" rtlCol="0">
+                <a:spAutoFit/>
+              </a:bodyPr>
+              <a:lstStyle/>
+              <a:p>
+                <a:pPr/>
+                <a14:m>
+                  <m:oMathPara xmlns:m="http://schemas.openxmlformats.org/officeDocument/2006/math">
+                    <m:oMathParaPr>
+                      <m:jc m:val="centerGroup"/>
+                    </m:oMathParaPr>
+                    <m:oMath xmlns:m="http://schemas.openxmlformats.org/officeDocument/2006/math">
+                      <m:r>
+                        <a:rPr lang="en-GB" sz="2400" b="0" i="1" smtClean="0">
+                          <a:latin typeface="Cambria Math" panose="02040503050406030204" pitchFamily="18" charset="0"/>
+                        </a:rPr>
+                        <m:t>𝑓</m:t>
+                      </m:r>
+                      <m:d>
+                        <m:dPr>
+                          <m:ctrlPr>
+                            <a:rPr lang="en-GB" sz="2400" b="0" i="1" smtClean="0">
+                              <a:latin typeface="Cambria Math" panose="02040503050406030204" pitchFamily="18" charset="0"/>
+                            </a:rPr>
+                          </m:ctrlPr>
+                        </m:dPr>
+                        <m:e>
+                          <m:nary>
+                            <m:naryPr>
+                              <m:chr m:val="∑"/>
+                              <m:ctrlPr>
+                                <a:rPr lang="en-GB" sz="2400" b="0" i="1" smtClean="0">
+                                  <a:latin typeface="Cambria Math" panose="02040503050406030204" pitchFamily="18" charset="0"/>
+                                </a:rPr>
+                              </m:ctrlPr>
+                            </m:naryPr>
+                            <m:sub>
+                              <m:r>
+                                <a:rPr lang="en-GB" sz="2400" b="0" i="1" smtClean="0">
+                                  <a:latin typeface="Cambria Math" panose="02040503050406030204" pitchFamily="18" charset="0"/>
+                                </a:rPr>
+                                <m:t>𝑖</m:t>
+                              </m:r>
+                              <m:r>
+                                <a:rPr lang="en-GB" sz="2400" b="0" i="1" smtClean="0">
+                                  <a:latin typeface="Cambria Math" panose="02040503050406030204" pitchFamily="18" charset="0"/>
+                                </a:rPr>
+                                <m:t>=1</m:t>
+                              </m:r>
+                            </m:sub>
+                            <m:sup>
+                              <m:r>
+                                <a:rPr lang="en-GB" sz="2400" b="0" i="1" smtClean="0">
+                                  <a:latin typeface="Cambria Math" panose="02040503050406030204" pitchFamily="18" charset="0"/>
+                                </a:rPr>
+                                <m:t>𝑛</m:t>
+                              </m:r>
+                            </m:sup>
+                            <m:e>
+                              <m:sSub>
+                                <m:sSubPr>
+                                  <m:ctrlPr>
+                                    <a:rPr lang="en-GB" sz="2400" b="0" i="1" smtClean="0">
+                                      <a:latin typeface="Cambria Math" panose="02040503050406030204" pitchFamily="18" charset="0"/>
+                                    </a:rPr>
+                                  </m:ctrlPr>
+                                </m:sSubPr>
+                                <m:e>
+                                  <m:r>
+                                    <a:rPr lang="en-GB" sz="2400" b="0" i="1" smtClean="0">
+                                      <a:latin typeface="Cambria Math" panose="02040503050406030204" pitchFamily="18" charset="0"/>
+                                    </a:rPr>
+                                    <m:t>𝑤</m:t>
+                                  </m:r>
+                                </m:e>
+                                <m:sub>
+                                  <m:r>
+                                    <a:rPr lang="en-GB" sz="2400" b="0" i="1" smtClean="0">
+                                      <a:latin typeface="Cambria Math" panose="02040503050406030204" pitchFamily="18" charset="0"/>
+                                    </a:rPr>
+                                    <m:t>𝑖</m:t>
+                                  </m:r>
+                                </m:sub>
+                              </m:sSub>
+                              <m:sSub>
+                                <m:sSubPr>
+                                  <m:ctrlPr>
+                                    <a:rPr lang="en-GB" sz="2400" b="0" i="1" smtClean="0">
+                                      <a:latin typeface="Cambria Math" panose="02040503050406030204" pitchFamily="18" charset="0"/>
+                                    </a:rPr>
+                                  </m:ctrlPr>
+                                </m:sSubPr>
+                                <m:e>
+                                  <m:r>
+                                    <a:rPr lang="en-GB" sz="2400" b="0" i="1" smtClean="0">
+                                      <a:latin typeface="Cambria Math" panose="02040503050406030204" pitchFamily="18" charset="0"/>
+                                    </a:rPr>
+                                    <m:t>𝑥</m:t>
+                                  </m:r>
+                                </m:e>
+                                <m:sub>
+                                  <m:r>
+                                    <a:rPr lang="en-GB" sz="2400" b="0" i="1" smtClean="0">
+                                      <a:latin typeface="Cambria Math" panose="02040503050406030204" pitchFamily="18" charset="0"/>
+                                    </a:rPr>
+                                    <m:t>𝑖</m:t>
+                                  </m:r>
+                                </m:sub>
+                              </m:sSub>
+                            </m:e>
+                          </m:nary>
+                        </m:e>
+                      </m:d>
+                    </m:oMath>
+                  </m:oMathPara>
+                </a14:m>
+                <a:endParaRPr lang="en-GB" sz="2400" dirty="0" err="1"/>
+              </a:p>
+            </p:txBody>
+          </p:sp>
+        </mc:Choice>
+        <mc:Fallback xmlns="">
+          <p:sp>
+            <p:nvSpPr>
+              <p:cNvPr id="11" name="TextBox 10">
+                <a:extLst>
+                  <a:ext uri="{FF2B5EF4-FFF2-40B4-BE49-F238E27FC236}">
+                    <a16:creationId xmlns:a16="http://schemas.microsoft.com/office/drawing/2014/main" id="{F3830371-EAA6-4614-87E7-B720386370C1}"/>
+                  </a:ext>
+                </a:extLst>
+              </p:cNvPr>
+              <p:cNvSpPr txBox="1">
+                <a:spLocks noRot="1" noChangeAspect="1" noMove="1" noResize="1" noEditPoints="1" noAdjustHandles="1" noChangeArrowheads="1" noChangeShapeType="1" noTextEdit="1"/>
+              </p:cNvSpPr>
+              <p:nvPr/>
+            </p:nvSpPr>
+            <p:spPr>
+              <a:xfrm>
+                <a:off x="1977089" y="5260258"/>
+                <a:ext cx="1910203" cy="1100558"/>
+              </a:xfrm>
+              <a:prstGeom prst="rect">
+                <a:avLst/>
+              </a:prstGeom>
+              <a:blipFill>
+                <a:blip r:embed="rId9"/>
+                <a:stretch>
+                  <a:fillRect/>
+                </a:stretch>
+              </a:blipFill>
+            </p:spPr>
+            <p:txBody>
+              <a:bodyPr/>
+              <a:lstStyle/>
+              <a:p>
+                <a:r>
+                  <a:rPr lang="en-GB">
+                    <a:noFill/>
+                  </a:rPr>
+                  <a:t> </a:t>
+                </a:r>
+              </a:p>
+            </p:txBody>
+          </p:sp>
+        </mc:Fallback>
+      </mc:AlternateContent>
     </p:spTree>
     <p:extLst>
       <p:ext uri="{BB962C8B-B14F-4D97-AF65-F5344CB8AC3E}">

</xml_diff>